<commit_message>
복수 Active system ppt 불러오기
</commit_message>
<xml_diff>
--- a/DsDotNet/src/UnitTest/UnitTest.Engine/ImportOffice/ppt/T11_SubLoading.pptx
+++ b/DsDotNet/src/UnitTest/UnitTest.Engine/ImportOffice/ppt/T11_SubLoading.pptx
@@ -216,7 +216,7 @@
           <a:p>
             <a:fld id="{DD503887-5801-43A0-AEF9-041E8DDC2558}" type="datetimeFigureOut">
               <a:rPr lang="ko-KR" altLang="en-US" smtClean="0"/>
-              <a:t>2022-12-08</a:t>
+              <a:t>2022-12-20</a:t>
             </a:fld>
             <a:endParaRPr lang="ko-KR" altLang="en-US"/>
           </a:p>
@@ -393,7 +393,7 @@
           <a:p>
             <a:fld id="{95336A0E-57B1-4D4C-BD9B-2F72B5943464}" type="datetimeFigureOut">
               <a:rPr lang="ko-KR" altLang="en-US" smtClean="0"/>
-              <a:t>2022-12-08</a:t>
+              <a:t>2022-12-20</a:t>
             </a:fld>
             <a:endParaRPr lang="ko-KR" altLang="en-US"/>
           </a:p>
@@ -755,7 +755,7 @@
           <a:effectLst/>
           <a:extLst>
             <a:ext uri="{91240B29-F687-4f45-9708-019B960494DF}">
-              <a14:hiddenLine xmlns:a14="http://schemas.microsoft.com/office/drawing/2010/main" xmlns="" w="9525">
+              <a14:hiddenLine xmlns="" xmlns:a14="http://schemas.microsoft.com/office/drawing/2010/main" w="9525">
                 <a:solidFill>
                   <a:srgbClr val="000000"/>
                 </a:solidFill>
@@ -947,7 +947,7 @@
           <a:p>
             <a:fld id="{DEA6EBF0-8E22-42A7-9BEA-2AC7066E6498}" type="datetimeFigureOut">
               <a:rPr lang="ko-KR" altLang="en-US" smtClean="0"/>
-              <a:t>2022-12-08</a:t>
+              <a:t>2022-12-20</a:t>
             </a:fld>
             <a:endParaRPr lang="ko-KR" altLang="en-US"/>
           </a:p>
@@ -1265,7 +1265,7 @@
           <a:p>
             <a:fld id="{DEA6EBF0-8E22-42A7-9BEA-2AC7066E6498}" type="datetimeFigureOut">
               <a:rPr lang="ko-KR" altLang="en-US" smtClean="0"/>
-              <a:t>2022-12-08</a:t>
+              <a:t>2022-12-20</a:t>
             </a:fld>
             <a:endParaRPr lang="ko-KR" altLang="en-US"/>
           </a:p>
@@ -1753,7 +1753,7 @@
           <a:p>
             <a:fld id="{DEA6EBF0-8E22-42A7-9BEA-2AC7066E6498}" type="datetimeFigureOut">
               <a:rPr lang="ko-KR" altLang="en-US" smtClean="0"/>
-              <a:t>2022-12-08</a:t>
+              <a:t>2022-12-20</a:t>
             </a:fld>
             <a:endParaRPr lang="ko-KR" altLang="en-US"/>
           </a:p>
@@ -2122,7 +2122,7 @@
           <a:p>
             <a:fld id="{DEA6EBF0-8E22-42A7-9BEA-2AC7066E6498}" type="datetimeFigureOut">
               <a:rPr lang="ko-KR" altLang="en-US" smtClean="0"/>
-              <a:t>2022-12-08</a:t>
+              <a:t>2022-12-20</a:t>
             </a:fld>
             <a:endParaRPr lang="ko-KR" altLang="en-US"/>
           </a:p>
@@ -2277,7 +2277,7 @@
           <a:ln/>
           <a:extLst>
             <a:ext uri="{91240B29-F687-4f45-9708-019B960494DF}">
-              <a14:hiddenLine xmlns:a14="http://schemas.microsoft.com/office/drawing/2010/main" xmlns="" w="9525">
+              <a14:hiddenLine xmlns="" xmlns:a14="http://schemas.microsoft.com/office/drawing/2010/main" w="9525">
                 <a:solidFill>
                   <a:srgbClr val="000000"/>
                 </a:solidFill>
@@ -2395,7 +2395,7 @@
           <a:p>
             <a:fld id="{DEA6EBF0-8E22-42A7-9BEA-2AC7066E6498}" type="datetimeFigureOut">
               <a:rPr lang="ko-KR" altLang="en-US" smtClean="0"/>
-              <a:t>2022-12-08</a:t>
+              <a:t>2022-12-20</a:t>
             </a:fld>
             <a:endParaRPr lang="ko-KR" altLang="en-US"/>
           </a:p>
@@ -2552,7 +2552,7 @@
           <a:ln/>
           <a:extLst>
             <a:ext uri="{91240B29-F687-4f45-9708-019B960494DF}">
-              <a14:hiddenLine xmlns:a14="http://schemas.microsoft.com/office/drawing/2010/main" xmlns="" w="9525">
+              <a14:hiddenLine xmlns="" xmlns:a14="http://schemas.microsoft.com/office/drawing/2010/main" w="9525">
                 <a:solidFill>
                   <a:srgbClr val="000000"/>
                 </a:solidFill>
@@ -2680,7 +2680,7 @@
           <a:p>
             <a:fld id="{DEA6EBF0-8E22-42A7-9BEA-2AC7066E6498}" type="datetimeFigureOut">
               <a:rPr lang="ko-KR" altLang="en-US" smtClean="0"/>
-              <a:t>2022-12-08</a:t>
+              <a:t>2022-12-20</a:t>
             </a:fld>
             <a:endParaRPr lang="ko-KR" altLang="en-US"/>
           </a:p>
@@ -2798,7 +2798,7 @@
           <a:p>
             <a:fld id="{DEA6EBF0-8E22-42A7-9BEA-2AC7066E6498}" type="datetimeFigureOut">
               <a:rPr lang="ko-KR" altLang="en-US" smtClean="0"/>
-              <a:t>2022-12-08</a:t>
+              <a:t>2022-12-20</a:t>
             </a:fld>
             <a:endParaRPr lang="ko-KR" altLang="en-US"/>
           </a:p>
@@ -2953,7 +2953,7 @@
           <a:ln/>
           <a:extLst>
             <a:ext uri="{91240B29-F687-4f45-9708-019B960494DF}">
-              <a14:hiddenLine xmlns:a14="http://schemas.microsoft.com/office/drawing/2010/main" xmlns="" w="9525">
+              <a14:hiddenLine xmlns="" xmlns:a14="http://schemas.microsoft.com/office/drawing/2010/main" w="9525">
                 <a:solidFill>
                   <a:srgbClr val="000000"/>
                 </a:solidFill>
@@ -3081,7 +3081,7 @@
           <a:p>
             <a:fld id="{DEA6EBF0-8E22-42A7-9BEA-2AC7066E6498}" type="datetimeFigureOut">
               <a:rPr lang="ko-KR" altLang="en-US" smtClean="0"/>
-              <a:t>2022-12-08</a:t>
+              <a:t>2022-12-20</a:t>
             </a:fld>
             <a:endParaRPr lang="ko-KR" altLang="en-US"/>
           </a:p>
@@ -3424,7 +3424,7 @@
           <a:p>
             <a:fld id="{DEA6EBF0-8E22-42A7-9BEA-2AC7066E6498}" type="datetimeFigureOut">
               <a:rPr lang="ko-KR" altLang="en-US" smtClean="0"/>
-              <a:t>2022-12-08</a:t>
+              <a:t>2022-12-20</a:t>
             </a:fld>
             <a:endParaRPr lang="ko-KR" altLang="en-US"/>
           </a:p>
@@ -3579,7 +3579,7 @@
           <a:ln/>
           <a:extLst>
             <a:ext uri="{91240B29-F687-4f45-9708-019B960494DF}">
-              <a14:hiddenLine xmlns:a14="http://schemas.microsoft.com/office/drawing/2010/main" xmlns="" w="9525">
+              <a14:hiddenLine xmlns="" xmlns:a14="http://schemas.microsoft.com/office/drawing/2010/main" w="9525">
                 <a:solidFill>
                   <a:srgbClr val="000000"/>
                 </a:solidFill>
@@ -3763,7 +3763,7 @@
           <a:p>
             <a:fld id="{DEA6EBF0-8E22-42A7-9BEA-2AC7066E6498}" type="datetimeFigureOut">
               <a:rPr lang="ko-KR" altLang="en-US" smtClean="0"/>
-              <a:t>2022-12-08</a:t>
+              <a:t>2022-12-20</a:t>
             </a:fld>
             <a:endParaRPr lang="ko-KR" altLang="en-US"/>
           </a:p>
@@ -3918,7 +3918,7 @@
           <a:ln/>
           <a:extLst>
             <a:ext uri="{91240B29-F687-4f45-9708-019B960494DF}">
-              <a14:hiddenLine xmlns:a14="http://schemas.microsoft.com/office/drawing/2010/main" xmlns="" w="9525">
+              <a14:hiddenLine xmlns="" xmlns:a14="http://schemas.microsoft.com/office/drawing/2010/main" w="9525">
                 <a:solidFill>
                   <a:srgbClr val="000000"/>
                 </a:solidFill>
@@ -4240,7 +4240,7 @@
           <a:p>
             <a:fld id="{DEA6EBF0-8E22-42A7-9BEA-2AC7066E6498}" type="datetimeFigureOut">
               <a:rPr lang="ko-KR" altLang="en-US" smtClean="0"/>
-              <a:t>2022-12-08</a:t>
+              <a:t>2022-12-20</a:t>
             </a:fld>
             <a:endParaRPr lang="ko-KR" altLang="en-US"/>
           </a:p>
@@ -4335,7 +4335,7 @@
           <a:p>
             <a:fld id="{DEA6EBF0-8E22-42A7-9BEA-2AC7066E6498}" type="datetimeFigureOut">
               <a:rPr lang="ko-KR" altLang="en-US" smtClean="0"/>
-              <a:t>2022-12-08</a:t>
+              <a:t>2022-12-20</a:t>
             </a:fld>
             <a:endParaRPr lang="ko-KR" altLang="en-US"/>
           </a:p>
@@ -4603,7 +4603,7 @@
           <a:ln/>
           <a:extLst>
             <a:ext uri="{91240B29-F687-4f45-9708-019B960494DF}">
-              <a14:hiddenLine xmlns:a14="http://schemas.microsoft.com/office/drawing/2010/main" xmlns="" w="9525">
+              <a14:hiddenLine xmlns="" xmlns:a14="http://schemas.microsoft.com/office/drawing/2010/main" w="9525">
                 <a:solidFill>
                   <a:srgbClr val="000000"/>
                 </a:solidFill>
@@ -4802,7 +4802,7 @@
           <a:p>
             <a:fld id="{DEA6EBF0-8E22-42A7-9BEA-2AC7066E6498}" type="datetimeFigureOut">
               <a:rPr lang="ko-KR" altLang="en-US" smtClean="0"/>
-              <a:t>2022-12-08</a:t>
+              <a:t>2022-12-20</a:t>
             </a:fld>
             <a:endParaRPr lang="ko-KR" altLang="en-US"/>
           </a:p>
@@ -5115,7 +5115,7 @@
           <a:p>
             <a:fld id="{DEA6EBF0-8E22-42A7-9BEA-2AC7066E6498}" type="datetimeFigureOut">
               <a:rPr lang="ko-KR" altLang="en-US" smtClean="0"/>
-              <a:t>2022-12-08</a:t>
+              <a:t>2022-12-20</a:t>
             </a:fld>
             <a:endParaRPr lang="ko-KR" altLang="en-US"/>
           </a:p>
@@ -5385,7 +5385,7 @@
           <a:p>
             <a:fld id="{DEA6EBF0-8E22-42A7-9BEA-2AC7066E6498}" type="datetimeFigureOut">
               <a:rPr lang="ko-KR" altLang="en-US" smtClean="0"/>
-              <a:t>2022-12-08</a:t>
+              <a:t>2022-12-20</a:t>
             </a:fld>
             <a:endParaRPr lang="ko-KR" altLang="en-US"/>
           </a:p>
@@ -6481,7 +6481,7 @@
             <a:pPr algn="ctr"/>
             <a:r>
               <a:rPr lang="en-US" altLang="ko-KR" dirty="0"/>
-              <a:t>Sub/Factroy </a:t>
+              <a:t>../sample/Sub/Factroy </a:t>
             </a:r>
           </a:p>
           <a:p>

</xml_diff>